<commit_message>
created 1st PPT in python
</commit_message>
<xml_diff>
--- a/static/fonts.pptx
+++ b/static/fonts.pptx
@@ -3090,7 +3090,41 @@
       <p:grpSpPr/>
       <p:sp>
         <p:nvSpPr>
-          <p:cNvPr id="2" name="TextBox 1"/>
+          <p:cNvPr id="2" name="Title 1"/>
+          <p:cNvSpPr>
+            <a:spLocks noGrp="1"/>
+          </p:cNvSpPr>
+          <p:nvPr>
+            <p:ph type="title"/>
+          </p:nvPr>
+        </p:nvSpPr>
+        <p:spPr/>
+        <p:txBody>
+          <a:bodyPr/>
+          <a:lstStyle/>
+          <a:p/>
+        </p:txBody>
+      </p:sp>
+      <p:sp>
+        <p:nvSpPr>
+          <p:cNvPr id="3" name="Content Placeholder 2"/>
+          <p:cNvSpPr>
+            <a:spLocks noGrp="1"/>
+          </p:cNvSpPr>
+          <p:nvPr>
+            <p:ph idx="1"/>
+          </p:nvPr>
+        </p:nvSpPr>
+        <p:spPr/>
+        <p:txBody>
+          <a:bodyPr/>
+          <a:lstStyle/>
+          <a:p/>
+        </p:txBody>
+      </p:sp>
+      <p:sp>
+        <p:nvSpPr>
+          <p:cNvPr id="4" name="TextBox 3"/>
           <p:cNvSpPr txBox="1"/>
           <p:nvPr/>
         </p:nvSpPr>

</xml_diff>